<commit_message>
M4-2 finito con codice
migliorati gli esempi su ListView e GridView
</commit_message>
<xml_diff>
--- a/Slides/03-Application key elements.pptx
+++ b/Slides/03-Application key elements.pptx
@@ -67,8 +67,8 @@
     <p:sldId id="341" r:id="rId58"/>
     <p:sldId id="351" r:id="rId59"/>
     <p:sldId id="352" r:id="rId60"/>
-    <p:sldId id="350" r:id="rId61"/>
-    <p:sldId id="355" r:id="rId62"/>
+    <p:sldId id="390" r:id="rId61"/>
+    <p:sldId id="350" r:id="rId62"/>
   </p:sldIdLst>
   <p:sldSz cx="12192000" cy="6858000"/>
   <p:notesSz cx="6858000" cy="9144000"/>
@@ -257,7 +257,7 @@
           <a:p>
             <a:fld id="{A7EBB5C6-BC59-4AE5-A6E0-8DD141F892FA}" type="datetimeFigureOut">
               <a:rPr lang="en-US" smtClean="0"/>
-              <a:t>11/10/2022</a:t>
+              <a:t>12/6/2022</a:t>
             </a:fld>
             <a:endParaRPr lang="en-US"/>
           </a:p>
@@ -30415,6 +30415,1278 @@
           <p:cNvPr id="2" name="Titolo 1">
             <a:extLst>
               <a:ext uri="{FF2B5EF4-FFF2-40B4-BE49-F238E27FC236}">
+                <a16:creationId xmlns:a16="http://schemas.microsoft.com/office/drawing/2014/main" id="{B2343F8F-4EF4-9A19-C395-77327EE8E309}"/>
+              </a:ext>
+            </a:extLst>
+          </p:cNvPr>
+          <p:cNvSpPr>
+            <a:spLocks noGrp="1"/>
+          </p:cNvSpPr>
+          <p:nvPr>
+            <p:ph type="title"/>
+          </p:nvPr>
+        </p:nvSpPr>
+        <p:spPr/>
+        <p:txBody>
+          <a:bodyPr/>
+          <a:lstStyle/>
+          <a:p>
+            <a:r>
+              <a:rPr lang="en-US" dirty="0" err="1"/>
+              <a:t>OnViewCreated</a:t>
+            </a:r>
+            <a:endParaRPr lang="en-US" dirty="0"/>
+          </a:p>
+        </p:txBody>
+      </p:sp>
+      <p:sp>
+        <p:nvSpPr>
+          <p:cNvPr id="3" name="Segnaposto contenuto 2">
+            <a:extLst>
+              <a:ext uri="{FF2B5EF4-FFF2-40B4-BE49-F238E27FC236}">
+                <a16:creationId xmlns:a16="http://schemas.microsoft.com/office/drawing/2014/main" id="{ED622A54-58A0-CCCB-4193-03A423B65834}"/>
+              </a:ext>
+            </a:extLst>
+          </p:cNvPr>
+          <p:cNvSpPr>
+            <a:spLocks noGrp="1"/>
+          </p:cNvSpPr>
+          <p:nvPr>
+            <p:ph idx="1"/>
+          </p:nvPr>
+        </p:nvSpPr>
+        <p:spPr>
+          <a:xfrm>
+            <a:off x="609600" y="1600201"/>
+            <a:ext cx="4742046" cy="4525963"/>
+          </a:xfrm>
+        </p:spPr>
+        <p:txBody>
+          <a:bodyPr>
+            <a:normAutofit/>
+          </a:bodyPr>
+          <a:lstStyle/>
+          <a:p>
+            <a:pPr marL="0" indent="0">
+              <a:buNone/>
+            </a:pPr>
+            <a:r>
+              <a:rPr lang="en-US" sz="1400" dirty="0"/>
+              <a:t>Fragment often contains elements such as buttons, </a:t>
+            </a:r>
+            <a:r>
+              <a:rPr lang="en-US" sz="1400" dirty="0" err="1"/>
+              <a:t>editText</a:t>
+            </a:r>
+            <a:r>
+              <a:rPr lang="en-US" sz="1400" dirty="0"/>
+              <a:t> etc.. how do we access them and get a reference?</a:t>
+            </a:r>
+          </a:p>
+          <a:p>
+            <a:pPr marL="0" indent="0">
+              <a:buNone/>
+            </a:pPr>
+            <a:endParaRPr lang="en-US" sz="1400" dirty="0"/>
+          </a:p>
+          <a:p>
+            <a:pPr marL="0" indent="0">
+              <a:buNone/>
+            </a:pPr>
+            <a:r>
+              <a:rPr lang="en-US" sz="1400" dirty="0"/>
+              <a:t>Called immediately after </a:t>
+            </a:r>
+            <a:r>
+              <a:rPr lang="en-US" sz="1400" dirty="0" err="1"/>
+              <a:t>onCreateView</a:t>
+            </a:r>
+            <a:r>
+              <a:rPr lang="en-US" sz="1400" dirty="0"/>
+              <a:t> has returned, but before any saved state has been restored into the view. This gives subclasses a chance to initialize themselves once they know their view hierarchy has been completely created. The fragment's view hierarchy is not however attached to its parent at this point. </a:t>
+            </a:r>
+          </a:p>
+          <a:p>
+            <a:pPr marL="0" indent="0">
+              <a:buNone/>
+            </a:pPr>
+            <a:endParaRPr lang="en-US" sz="1400" dirty="0"/>
+          </a:p>
+          <a:p>
+            <a:pPr marL="0" indent="0">
+              <a:buNone/>
+            </a:pPr>
+            <a:endParaRPr lang="en-US" sz="1400" dirty="0"/>
+          </a:p>
+          <a:p>
+            <a:pPr marL="0" indent="0">
+              <a:buNone/>
+            </a:pPr>
+            <a:r>
+              <a:rPr lang="en-US" sz="1600" dirty="0"/>
+              <a:t>Parameters: </a:t>
+            </a:r>
+          </a:p>
+          <a:p>
+            <a:r>
+              <a:rPr lang="en-US" sz="1400" b="1" dirty="0">
+                <a:latin typeface="+mj-lt"/>
+              </a:rPr>
+              <a:t>View </a:t>
+            </a:r>
+            <a:r>
+              <a:rPr lang="en-US" sz="1400" b="1" dirty="0" err="1">
+                <a:latin typeface="+mj-lt"/>
+              </a:rPr>
+              <a:t>view</a:t>
+            </a:r>
+            <a:r>
+              <a:rPr lang="en-US" sz="1400" dirty="0">
+                <a:latin typeface="+mj-lt"/>
+              </a:rPr>
+              <a:t>: </a:t>
+            </a:r>
+            <a:r>
+              <a:rPr lang="en-US" sz="1400" dirty="0">
+                <a:effectLst/>
+                <a:latin typeface="+mj-lt"/>
+              </a:rPr>
+              <a:t>The View returned by </a:t>
+            </a:r>
+            <a:r>
+              <a:rPr lang="en-US" sz="1400" dirty="0" err="1">
+                <a:effectLst/>
+                <a:latin typeface="+mj-lt"/>
+              </a:rPr>
+              <a:t>onCreateView</a:t>
+            </a:r>
+            <a:r>
+              <a:rPr lang="en-US" sz="1400" dirty="0">
+                <a:effectLst/>
+                <a:latin typeface="+mj-lt"/>
+              </a:rPr>
+              <a:t>()</a:t>
+            </a:r>
+          </a:p>
+          <a:p>
+            <a:r>
+              <a:rPr lang="en-US" sz="1400" b="1" dirty="0">
+                <a:effectLst/>
+                <a:latin typeface="+mj-lt"/>
+              </a:rPr>
+              <a:t>Bundle </a:t>
+            </a:r>
+            <a:r>
+              <a:rPr lang="en-US" sz="1400" b="1" dirty="0" err="1">
+                <a:effectLst/>
+                <a:latin typeface="+mj-lt"/>
+              </a:rPr>
+              <a:t>savedInstanceState</a:t>
+            </a:r>
+            <a:r>
+              <a:rPr lang="en-US" sz="1400" dirty="0">
+                <a:latin typeface="+mj-lt"/>
+              </a:rPr>
+              <a:t>: </a:t>
+            </a:r>
+            <a:r>
+              <a:rPr lang="en-US" sz="1400" dirty="0">
+                <a:effectLst/>
+                <a:latin typeface="+mj-lt"/>
+              </a:rPr>
+              <a:t>If non-null, this fragment is being re-constructed from a previous saved state as given here.</a:t>
+            </a:r>
+          </a:p>
+          <a:p>
+            <a:endParaRPr lang="en-US" sz="2000" dirty="0"/>
+          </a:p>
+          <a:p>
+            <a:pPr marL="0" indent="0">
+              <a:buNone/>
+            </a:pPr>
+            <a:endParaRPr lang="en-US" sz="2800" dirty="0"/>
+          </a:p>
+        </p:txBody>
+      </p:sp>
+      <p:grpSp>
+        <p:nvGrpSpPr>
+          <p:cNvPr id="7" name="Gruppo 6">
+            <a:extLst>
+              <a:ext uri="{FF2B5EF4-FFF2-40B4-BE49-F238E27FC236}">
+                <a16:creationId xmlns:a16="http://schemas.microsoft.com/office/drawing/2014/main" id="{F027B8F9-553F-700C-EF8D-BB5D6E9D5F6C}"/>
+              </a:ext>
+            </a:extLst>
+          </p:cNvPr>
+          <p:cNvGrpSpPr/>
+          <p:nvPr/>
+        </p:nvGrpSpPr>
+        <p:grpSpPr>
+          <a:xfrm>
+            <a:off x="5787441" y="1852546"/>
+            <a:ext cx="2105830" cy="4608093"/>
+            <a:chOff x="5507753" y="1549668"/>
+            <a:chExt cx="2182069" cy="4849043"/>
+          </a:xfrm>
+        </p:grpSpPr>
+        <p:pic>
+          <p:nvPicPr>
+            <p:cNvPr id="4" name="Immagine 3">
+              <a:extLst>
+                <a:ext uri="{FF2B5EF4-FFF2-40B4-BE49-F238E27FC236}">
+                  <a16:creationId xmlns:a16="http://schemas.microsoft.com/office/drawing/2014/main" id="{D9E350FC-9A3C-DD00-C025-3B744527301E}"/>
+                </a:ext>
+              </a:extLst>
+            </p:cNvPr>
+            <p:cNvPicPr>
+              <a:picLocks noChangeAspect="1"/>
+            </p:cNvPicPr>
+            <p:nvPr/>
+          </p:nvPicPr>
+          <p:blipFill>
+            <a:blip r:embed="rId2">
+              <a:extLst>
+                <a:ext uri="{28A0092B-C50C-407E-A947-70E740481C1C}">
+                  <a14:useLocalDpi xmlns:a14="http://schemas.microsoft.com/office/drawing/2010/main" val="0"/>
+                </a:ext>
+              </a:extLst>
+            </a:blip>
+            <a:stretch>
+              <a:fillRect/>
+            </a:stretch>
+          </p:blipFill>
+          <p:spPr>
+            <a:xfrm>
+              <a:off x="5507753" y="1549668"/>
+              <a:ext cx="2182069" cy="4849043"/>
+            </a:xfrm>
+            <a:prstGeom prst="roundRect">
+              <a:avLst>
+                <a:gd name="adj" fmla="val 5463"/>
+              </a:avLst>
+            </a:prstGeom>
+            <a:ln>
+              <a:solidFill>
+                <a:schemeClr val="tx1"/>
+              </a:solidFill>
+            </a:ln>
+          </p:spPr>
+        </p:pic>
+        <p:sp>
+          <p:nvSpPr>
+            <p:cNvPr id="5" name="Rettangolo con angoli arrotondati 4">
+              <a:extLst>
+                <a:ext uri="{FF2B5EF4-FFF2-40B4-BE49-F238E27FC236}">
+                  <a16:creationId xmlns:a16="http://schemas.microsoft.com/office/drawing/2014/main" id="{689A201C-23A9-F949-43DE-AC74E7640B03}"/>
+                </a:ext>
+              </a:extLst>
+            </p:cNvPr>
+            <p:cNvSpPr/>
+            <p:nvPr/>
+          </p:nvSpPr>
+          <p:spPr>
+            <a:xfrm>
+              <a:off x="6138378" y="3429000"/>
+              <a:ext cx="920817" cy="575109"/>
+            </a:xfrm>
+            <a:prstGeom prst="roundRect">
+              <a:avLst/>
+            </a:prstGeom>
+            <a:noFill/>
+            <a:ln w="28575">
+              <a:solidFill>
+                <a:srgbClr val="FF0000"/>
+              </a:solidFill>
+            </a:ln>
+          </p:spPr>
+          <p:style>
+            <a:lnRef idx="1">
+              <a:schemeClr val="accent1"/>
+            </a:lnRef>
+            <a:fillRef idx="3">
+              <a:schemeClr val="accent1"/>
+            </a:fillRef>
+            <a:effectRef idx="2">
+              <a:schemeClr val="accent1"/>
+            </a:effectRef>
+            <a:fontRef idx="minor">
+              <a:schemeClr val="lt1"/>
+            </a:fontRef>
+          </p:style>
+          <p:txBody>
+            <a:bodyPr rtlCol="0" anchor="ctr"/>
+            <a:lstStyle/>
+            <a:p>
+              <a:pPr algn="ctr"/>
+              <a:endParaRPr lang="en-US" dirty="0"/>
+            </a:p>
+          </p:txBody>
+        </p:sp>
+        <p:sp>
+          <p:nvSpPr>
+            <p:cNvPr id="6" name="CasellaDiTesto 5">
+              <a:extLst>
+                <a:ext uri="{FF2B5EF4-FFF2-40B4-BE49-F238E27FC236}">
+                  <a16:creationId xmlns:a16="http://schemas.microsoft.com/office/drawing/2014/main" id="{5875F307-3C1F-BFEB-C5DA-99F852ED5467}"/>
+                </a:ext>
+              </a:extLst>
+            </p:cNvPr>
+            <p:cNvSpPr txBox="1"/>
+            <p:nvPr/>
+          </p:nvSpPr>
+          <p:spPr>
+            <a:xfrm>
+              <a:off x="6438747" y="3059668"/>
+              <a:ext cx="433137" cy="369332"/>
+            </a:xfrm>
+            <a:prstGeom prst="rect">
+              <a:avLst/>
+            </a:prstGeom>
+            <a:noFill/>
+          </p:spPr>
+          <p:txBody>
+            <a:bodyPr wrap="square" rtlCol="0">
+              <a:spAutoFit/>
+            </a:bodyPr>
+            <a:lstStyle/>
+            <a:p>
+              <a:r>
+                <a:rPr lang="en-US" dirty="0"/>
+                <a:t>?</a:t>
+              </a:r>
+            </a:p>
+          </p:txBody>
+        </p:sp>
+      </p:grpSp>
+      <p:sp>
+        <p:nvSpPr>
+          <p:cNvPr id="11" name="Rectangle 2">
+            <a:extLst>
+              <a:ext uri="{FF2B5EF4-FFF2-40B4-BE49-F238E27FC236}">
+                <a16:creationId xmlns:a16="http://schemas.microsoft.com/office/drawing/2014/main" id="{DCEDDC0E-06BE-1A2E-574E-FAE549C40F53}"/>
+              </a:ext>
+            </a:extLst>
+          </p:cNvPr>
+          <p:cNvSpPr>
+            <a:spLocks noChangeArrowheads="1"/>
+          </p:cNvSpPr>
+          <p:nvPr/>
+        </p:nvSpPr>
+        <p:spPr bwMode="auto">
+          <a:xfrm>
+            <a:off x="8183144" y="2354147"/>
+            <a:ext cx="3521175" cy="3323987"/>
+          </a:xfrm>
+          <a:prstGeom prst="rect">
+            <a:avLst/>
+          </a:prstGeom>
+          <a:noFill/>
+          <a:ln>
+            <a:noFill/>
+          </a:ln>
+          <a:effectLst/>
+        </p:spPr>
+        <p:txBody>
+          <a:bodyPr vert="horz" wrap="square" lIns="91440" tIns="45720" rIns="91440" bIns="45720" numCol="1" anchor="ctr" anchorCtr="0" compatLnSpc="1">
+            <a:prstTxWarp prst="textNoShape">
+              <a:avLst/>
+            </a:prstTxWarp>
+            <a:spAutoFit/>
+          </a:bodyPr>
+          <a:lstStyle/>
+          <a:p>
+            <a:pPr marL="0" marR="0" lvl="0" indent="0" algn="l" defTabSz="914400" rtl="0" eaLnBrk="0" fontAlgn="base" latinLnBrk="0" hangingPunct="0">
+              <a:lnSpc>
+                <a:spcPct val="100000"/>
+              </a:lnSpc>
+              <a:spcBef>
+                <a:spcPct val="0"/>
+              </a:spcBef>
+              <a:spcAft>
+                <a:spcPct val="0"/>
+              </a:spcAft>
+              <a:buClrTx/>
+              <a:buSzTx/>
+              <a:buFontTx/>
+              <a:buNone/>
+              <a:tabLst/>
+            </a:pPr>
+            <a:r>
+              <a:rPr kumimoji="0" lang="en-US" altLang="en-US" sz="1000" b="1" i="0" u="none" strike="noStrike" cap="none" normalizeH="0" baseline="0" dirty="0">
+                <a:ln>
+                  <a:noFill/>
+                </a:ln>
+                <a:solidFill>
+                  <a:sysClr val="windowText" lastClr="000000"/>
+                </a:solidFill>
+                <a:effectLst/>
+                <a:latin typeface="JetBrains Mono"/>
+              </a:rPr>
+              <a:t>public class Fragment1 extends Fragment {</a:t>
+            </a:r>
+            <a:br>
+              <a:rPr kumimoji="0" lang="en-US" altLang="en-US" sz="1000" b="1" i="0" u="none" strike="noStrike" cap="none" normalizeH="0" baseline="0" dirty="0">
+                <a:ln>
+                  <a:noFill/>
+                </a:ln>
+                <a:solidFill>
+                  <a:sysClr val="windowText" lastClr="000000"/>
+                </a:solidFill>
+                <a:effectLst/>
+                <a:latin typeface="JetBrains Mono"/>
+              </a:rPr>
+            </a:br>
+            <a:br>
+              <a:rPr kumimoji="0" lang="en-US" altLang="en-US" sz="1000" b="1" i="0" u="none" strike="noStrike" cap="none" normalizeH="0" baseline="0" dirty="0">
+                <a:ln>
+                  <a:noFill/>
+                </a:ln>
+                <a:solidFill>
+                  <a:sysClr val="windowText" lastClr="000000"/>
+                </a:solidFill>
+                <a:effectLst/>
+                <a:latin typeface="JetBrains Mono"/>
+              </a:rPr>
+            </a:br>
+            <a:r>
+              <a:rPr kumimoji="0" lang="en-US" altLang="en-US" sz="1000" b="1" i="0" u="none" strike="noStrike" cap="none" normalizeH="0" baseline="0" dirty="0">
+                <a:ln>
+                  <a:noFill/>
+                </a:ln>
+                <a:solidFill>
+                  <a:sysClr val="windowText" lastClr="000000"/>
+                </a:solidFill>
+                <a:effectLst/>
+                <a:latin typeface="JetBrains Mono"/>
+              </a:rPr>
+              <a:t>    Button </a:t>
+            </a:r>
+            <a:r>
+              <a:rPr kumimoji="0" lang="en-US" altLang="en-US" sz="1000" b="1" i="0" u="none" strike="noStrike" cap="none" normalizeH="0" baseline="0" dirty="0" err="1">
+                <a:ln>
+                  <a:noFill/>
+                </a:ln>
+                <a:solidFill>
+                  <a:sysClr val="windowText" lastClr="000000"/>
+                </a:solidFill>
+                <a:effectLst/>
+                <a:latin typeface="JetBrains Mono"/>
+              </a:rPr>
+              <a:t>button</a:t>
+            </a:r>
+            <a:r>
+              <a:rPr kumimoji="0" lang="en-US" altLang="en-US" sz="1000" b="1" i="0" u="none" strike="noStrike" cap="none" normalizeH="0" baseline="0" dirty="0">
+                <a:ln>
+                  <a:noFill/>
+                </a:ln>
+                <a:solidFill>
+                  <a:sysClr val="windowText" lastClr="000000"/>
+                </a:solidFill>
+                <a:effectLst/>
+                <a:latin typeface="JetBrains Mono"/>
+              </a:rPr>
+              <a:t>;</a:t>
+            </a:r>
+            <a:br>
+              <a:rPr kumimoji="0" lang="en-US" altLang="en-US" sz="1000" b="1" i="0" u="none" strike="noStrike" cap="none" normalizeH="0" baseline="0" dirty="0">
+                <a:ln>
+                  <a:noFill/>
+                </a:ln>
+                <a:solidFill>
+                  <a:sysClr val="windowText" lastClr="000000"/>
+                </a:solidFill>
+                <a:effectLst/>
+                <a:latin typeface="JetBrains Mono"/>
+              </a:rPr>
+            </a:br>
+            <a:br>
+              <a:rPr kumimoji="0" lang="en-US" altLang="en-US" sz="1000" b="1" i="0" u="none" strike="noStrike" cap="none" normalizeH="0" baseline="0" dirty="0">
+                <a:ln>
+                  <a:noFill/>
+                </a:ln>
+                <a:solidFill>
+                  <a:sysClr val="windowText" lastClr="000000"/>
+                </a:solidFill>
+                <a:effectLst/>
+                <a:latin typeface="JetBrains Mono"/>
+              </a:rPr>
+            </a:br>
+            <a:r>
+              <a:rPr kumimoji="0" lang="en-US" altLang="en-US" sz="1000" b="1" i="0" u="none" strike="noStrike" cap="none" normalizeH="0" baseline="0" dirty="0">
+                <a:ln>
+                  <a:noFill/>
+                </a:ln>
+                <a:solidFill>
+                  <a:sysClr val="windowText" lastClr="000000"/>
+                </a:solidFill>
+                <a:effectLst/>
+                <a:latin typeface="JetBrains Mono"/>
+              </a:rPr>
+              <a:t>    @Override</a:t>
+            </a:r>
+            <a:br>
+              <a:rPr kumimoji="0" lang="en-US" altLang="en-US" sz="1000" b="1" i="0" u="none" strike="noStrike" cap="none" normalizeH="0" baseline="0" dirty="0">
+                <a:ln>
+                  <a:noFill/>
+                </a:ln>
+                <a:solidFill>
+                  <a:sysClr val="windowText" lastClr="000000"/>
+                </a:solidFill>
+                <a:effectLst/>
+                <a:latin typeface="JetBrains Mono"/>
+              </a:rPr>
+            </a:br>
+            <a:r>
+              <a:rPr kumimoji="0" lang="en-US" altLang="en-US" sz="1000" b="1" i="0" u="none" strike="noStrike" cap="none" normalizeH="0" baseline="0" dirty="0">
+                <a:ln>
+                  <a:noFill/>
+                </a:ln>
+                <a:solidFill>
+                  <a:sysClr val="windowText" lastClr="000000"/>
+                </a:solidFill>
+                <a:effectLst/>
+                <a:latin typeface="JetBrains Mono"/>
+              </a:rPr>
+              <a:t>    public View </a:t>
+            </a:r>
+            <a:r>
+              <a:rPr kumimoji="0" lang="en-US" altLang="en-US" sz="1000" b="1" i="0" u="none" strike="noStrike" cap="none" normalizeH="0" baseline="0" dirty="0" err="1">
+                <a:ln>
+                  <a:noFill/>
+                </a:ln>
+                <a:solidFill>
+                  <a:sysClr val="windowText" lastClr="000000"/>
+                </a:solidFill>
+                <a:effectLst/>
+                <a:latin typeface="JetBrains Mono"/>
+              </a:rPr>
+              <a:t>onCreateView</a:t>
+            </a:r>
+            <a:r>
+              <a:rPr kumimoji="0" lang="en-US" altLang="en-US" sz="1000" b="1" i="0" u="none" strike="noStrike" cap="none" normalizeH="0" baseline="0" dirty="0">
+                <a:ln>
+                  <a:noFill/>
+                </a:ln>
+                <a:solidFill>
+                  <a:sysClr val="windowText" lastClr="000000"/>
+                </a:solidFill>
+                <a:effectLst/>
+                <a:latin typeface="JetBrains Mono"/>
+              </a:rPr>
+              <a:t>(</a:t>
+            </a:r>
+            <a:r>
+              <a:rPr kumimoji="0" lang="en-US" altLang="en-US" sz="1000" b="1" i="0" u="none" strike="noStrike" cap="none" normalizeH="0" baseline="0" dirty="0" err="1">
+                <a:ln>
+                  <a:noFill/>
+                </a:ln>
+                <a:solidFill>
+                  <a:sysClr val="windowText" lastClr="000000"/>
+                </a:solidFill>
+                <a:effectLst/>
+                <a:latin typeface="JetBrains Mono"/>
+              </a:rPr>
+              <a:t>LayoutInflater</a:t>
+            </a:r>
+            <a:r>
+              <a:rPr kumimoji="0" lang="en-US" altLang="en-US" sz="1000" b="1" i="0" u="none" strike="noStrike" cap="none" normalizeH="0" baseline="0" dirty="0">
+                <a:ln>
+                  <a:noFill/>
+                </a:ln>
+                <a:solidFill>
+                  <a:sysClr val="windowText" lastClr="000000"/>
+                </a:solidFill>
+                <a:effectLst/>
+                <a:latin typeface="JetBrains Mono"/>
+              </a:rPr>
+              <a:t> inflater, </a:t>
+            </a:r>
+            <a:r>
+              <a:rPr kumimoji="0" lang="en-US" altLang="en-US" sz="1000" b="1" i="0" u="none" strike="noStrike" cap="none" normalizeH="0" baseline="0" dirty="0" err="1">
+                <a:ln>
+                  <a:noFill/>
+                </a:ln>
+                <a:solidFill>
+                  <a:sysClr val="windowText" lastClr="000000"/>
+                </a:solidFill>
+                <a:effectLst/>
+                <a:latin typeface="JetBrains Mono"/>
+              </a:rPr>
+              <a:t>ViewGroup</a:t>
+            </a:r>
+            <a:r>
+              <a:rPr kumimoji="0" lang="en-US" altLang="en-US" sz="1000" b="1" i="0" u="none" strike="noStrike" cap="none" normalizeH="0" baseline="0" dirty="0">
+                <a:ln>
+                  <a:noFill/>
+                </a:ln>
+                <a:solidFill>
+                  <a:sysClr val="windowText" lastClr="000000"/>
+                </a:solidFill>
+                <a:effectLst/>
+                <a:latin typeface="JetBrains Mono"/>
+              </a:rPr>
+              <a:t> container, Bundle </a:t>
+            </a:r>
+            <a:r>
+              <a:rPr kumimoji="0" lang="en-US" altLang="en-US" sz="1000" b="1" i="0" u="none" strike="noStrike" cap="none" normalizeH="0" baseline="0" dirty="0" err="1">
+                <a:ln>
+                  <a:noFill/>
+                </a:ln>
+                <a:solidFill>
+                  <a:sysClr val="windowText" lastClr="000000"/>
+                </a:solidFill>
+                <a:effectLst/>
+                <a:latin typeface="JetBrains Mono"/>
+              </a:rPr>
+              <a:t>savedInstanceState</a:t>
+            </a:r>
+            <a:r>
+              <a:rPr kumimoji="0" lang="en-US" altLang="en-US" sz="1000" b="1" i="0" u="none" strike="noStrike" cap="none" normalizeH="0" baseline="0" dirty="0">
+                <a:ln>
+                  <a:noFill/>
+                </a:ln>
+                <a:solidFill>
+                  <a:sysClr val="windowText" lastClr="000000"/>
+                </a:solidFill>
+                <a:effectLst/>
+                <a:latin typeface="JetBrains Mono"/>
+              </a:rPr>
+              <a:t>) {</a:t>
+            </a:r>
+            <a:br>
+              <a:rPr kumimoji="0" lang="en-US" altLang="en-US" sz="1000" b="1" i="0" u="none" strike="noStrike" cap="none" normalizeH="0" baseline="0" dirty="0">
+                <a:ln>
+                  <a:noFill/>
+                </a:ln>
+                <a:solidFill>
+                  <a:sysClr val="windowText" lastClr="000000"/>
+                </a:solidFill>
+                <a:effectLst/>
+                <a:latin typeface="JetBrains Mono"/>
+              </a:rPr>
+            </a:br>
+            <a:r>
+              <a:rPr kumimoji="0" lang="en-US" altLang="en-US" sz="1000" b="1" i="0" u="none" strike="noStrike" cap="none" normalizeH="0" baseline="0" dirty="0">
+                <a:ln>
+                  <a:noFill/>
+                </a:ln>
+                <a:solidFill>
+                  <a:sysClr val="windowText" lastClr="000000"/>
+                </a:solidFill>
+                <a:effectLst/>
+                <a:latin typeface="JetBrains Mono"/>
+              </a:rPr>
+              <a:t>        // Inflate the layout for this fragment</a:t>
+            </a:r>
+            <a:br>
+              <a:rPr kumimoji="0" lang="en-US" altLang="en-US" sz="1000" b="1" i="0" u="none" strike="noStrike" cap="none" normalizeH="0" baseline="0" dirty="0">
+                <a:ln>
+                  <a:noFill/>
+                </a:ln>
+                <a:solidFill>
+                  <a:sysClr val="windowText" lastClr="000000"/>
+                </a:solidFill>
+                <a:effectLst/>
+                <a:latin typeface="JetBrains Mono"/>
+              </a:rPr>
+            </a:br>
+            <a:r>
+              <a:rPr kumimoji="0" lang="en-US" altLang="en-US" sz="1000" b="1" i="0" u="none" strike="noStrike" cap="none" normalizeH="0" baseline="0" dirty="0">
+                <a:ln>
+                  <a:noFill/>
+                </a:ln>
+                <a:solidFill>
+                  <a:sysClr val="windowText" lastClr="000000"/>
+                </a:solidFill>
+                <a:effectLst/>
+                <a:latin typeface="JetBrains Mono"/>
+              </a:rPr>
+              <a:t>        return </a:t>
+            </a:r>
+            <a:r>
+              <a:rPr kumimoji="0" lang="en-US" altLang="en-US" sz="1000" b="1" i="0" u="none" strike="noStrike" cap="none" normalizeH="0" baseline="0" dirty="0" err="1">
+                <a:ln>
+                  <a:noFill/>
+                </a:ln>
+                <a:solidFill>
+                  <a:sysClr val="windowText" lastClr="000000"/>
+                </a:solidFill>
+                <a:effectLst/>
+                <a:latin typeface="JetBrains Mono"/>
+              </a:rPr>
+              <a:t>inflater.inflate</a:t>
+            </a:r>
+            <a:r>
+              <a:rPr kumimoji="0" lang="en-US" altLang="en-US" sz="1000" b="1" i="0" u="none" strike="noStrike" cap="none" normalizeH="0" baseline="0" dirty="0">
+                <a:ln>
+                  <a:noFill/>
+                </a:ln>
+                <a:solidFill>
+                  <a:sysClr val="windowText" lastClr="000000"/>
+                </a:solidFill>
+                <a:effectLst/>
+                <a:latin typeface="JetBrains Mono"/>
+              </a:rPr>
+              <a:t>(R.layout.</a:t>
+            </a:r>
+            <a:r>
+              <a:rPr kumimoji="0" lang="en-US" altLang="en-US" sz="1000" b="1" i="1" u="none" strike="noStrike" cap="none" normalizeH="0" baseline="0" dirty="0">
+                <a:ln>
+                  <a:noFill/>
+                </a:ln>
+                <a:solidFill>
+                  <a:sysClr val="windowText" lastClr="000000"/>
+                </a:solidFill>
+                <a:effectLst/>
+                <a:latin typeface="JetBrains Mono"/>
+              </a:rPr>
+              <a:t>fragment_1</a:t>
+            </a:r>
+            <a:r>
+              <a:rPr kumimoji="0" lang="en-US" altLang="en-US" sz="1000" b="1" i="0" u="none" strike="noStrike" cap="none" normalizeH="0" baseline="0" dirty="0">
+                <a:ln>
+                  <a:noFill/>
+                </a:ln>
+                <a:solidFill>
+                  <a:sysClr val="windowText" lastClr="000000"/>
+                </a:solidFill>
+                <a:effectLst/>
+                <a:latin typeface="JetBrains Mono"/>
+              </a:rPr>
+              <a:t>, container, false);</a:t>
+            </a:r>
+            <a:br>
+              <a:rPr kumimoji="0" lang="en-US" altLang="en-US" sz="1000" b="1" i="0" u="none" strike="noStrike" cap="none" normalizeH="0" baseline="0" dirty="0">
+                <a:ln>
+                  <a:noFill/>
+                </a:ln>
+                <a:solidFill>
+                  <a:sysClr val="windowText" lastClr="000000"/>
+                </a:solidFill>
+                <a:effectLst/>
+                <a:latin typeface="JetBrains Mono"/>
+              </a:rPr>
+            </a:br>
+            <a:r>
+              <a:rPr kumimoji="0" lang="en-US" altLang="en-US" sz="1000" b="1" i="0" u="none" strike="noStrike" cap="none" normalizeH="0" baseline="0" dirty="0">
+                <a:ln>
+                  <a:noFill/>
+                </a:ln>
+                <a:solidFill>
+                  <a:sysClr val="windowText" lastClr="000000"/>
+                </a:solidFill>
+                <a:effectLst/>
+                <a:latin typeface="JetBrains Mono"/>
+              </a:rPr>
+              <a:t>    }</a:t>
+            </a:r>
+            <a:br>
+              <a:rPr kumimoji="0" lang="en-US" altLang="en-US" sz="1000" b="1" i="0" u="none" strike="noStrike" cap="none" normalizeH="0" baseline="0" dirty="0">
+                <a:ln>
+                  <a:noFill/>
+                </a:ln>
+                <a:solidFill>
+                  <a:sysClr val="windowText" lastClr="000000"/>
+                </a:solidFill>
+                <a:effectLst/>
+                <a:latin typeface="JetBrains Mono"/>
+              </a:rPr>
+            </a:br>
+            <a:br>
+              <a:rPr kumimoji="0" lang="en-US" altLang="en-US" sz="1000" b="1" i="0" u="none" strike="noStrike" cap="none" normalizeH="0" baseline="0" dirty="0">
+                <a:ln>
+                  <a:noFill/>
+                </a:ln>
+                <a:solidFill>
+                  <a:sysClr val="windowText" lastClr="000000"/>
+                </a:solidFill>
+                <a:effectLst/>
+                <a:latin typeface="JetBrains Mono"/>
+              </a:rPr>
+            </a:br>
+            <a:r>
+              <a:rPr kumimoji="0" lang="en-US" altLang="en-US" sz="1000" b="1" i="0" u="none" strike="noStrike" cap="none" normalizeH="0" baseline="0" dirty="0">
+                <a:ln>
+                  <a:noFill/>
+                </a:ln>
+                <a:solidFill>
+                  <a:sysClr val="windowText" lastClr="000000"/>
+                </a:solidFill>
+                <a:effectLst/>
+                <a:latin typeface="JetBrains Mono"/>
+              </a:rPr>
+              <a:t>    @Override</a:t>
+            </a:r>
+            <a:br>
+              <a:rPr kumimoji="0" lang="en-US" altLang="en-US" sz="1000" b="1" i="0" u="none" strike="noStrike" cap="none" normalizeH="0" baseline="0" dirty="0">
+                <a:ln>
+                  <a:noFill/>
+                </a:ln>
+                <a:solidFill>
+                  <a:sysClr val="windowText" lastClr="000000"/>
+                </a:solidFill>
+                <a:effectLst/>
+                <a:latin typeface="JetBrains Mono"/>
+              </a:rPr>
+            </a:br>
+            <a:r>
+              <a:rPr kumimoji="0" lang="en-US" altLang="en-US" sz="1000" b="1" i="0" u="none" strike="noStrike" cap="none" normalizeH="0" baseline="0" dirty="0">
+                <a:ln>
+                  <a:noFill/>
+                </a:ln>
+                <a:solidFill>
+                  <a:sysClr val="windowText" lastClr="000000"/>
+                </a:solidFill>
+                <a:effectLst/>
+                <a:latin typeface="JetBrains Mono"/>
+              </a:rPr>
+              <a:t>    public void </a:t>
+            </a:r>
+            <a:r>
+              <a:rPr kumimoji="0" lang="en-US" altLang="en-US" sz="1000" b="1" i="0" u="none" strike="noStrike" cap="none" normalizeH="0" baseline="0" dirty="0" err="1">
+                <a:ln>
+                  <a:noFill/>
+                </a:ln>
+                <a:solidFill>
+                  <a:sysClr val="windowText" lastClr="000000"/>
+                </a:solidFill>
+                <a:effectLst/>
+                <a:latin typeface="JetBrains Mono"/>
+              </a:rPr>
+              <a:t>onViewCreated</a:t>
+            </a:r>
+            <a:r>
+              <a:rPr kumimoji="0" lang="en-US" altLang="en-US" sz="1000" b="1" i="0" u="none" strike="noStrike" cap="none" normalizeH="0" baseline="0" dirty="0">
+                <a:ln>
+                  <a:noFill/>
+                </a:ln>
+                <a:solidFill>
+                  <a:sysClr val="windowText" lastClr="000000"/>
+                </a:solidFill>
+                <a:effectLst/>
+                <a:latin typeface="JetBrains Mono"/>
+              </a:rPr>
+              <a:t>(@NonNull View </a:t>
+            </a:r>
+            <a:r>
+              <a:rPr kumimoji="0" lang="en-US" altLang="en-US" sz="1000" b="1" i="0" u="none" strike="noStrike" cap="none" normalizeH="0" baseline="0" dirty="0" err="1">
+                <a:ln>
+                  <a:noFill/>
+                </a:ln>
+                <a:solidFill>
+                  <a:sysClr val="windowText" lastClr="000000"/>
+                </a:solidFill>
+                <a:effectLst/>
+                <a:latin typeface="JetBrains Mono"/>
+              </a:rPr>
+              <a:t>view</a:t>
+            </a:r>
+            <a:r>
+              <a:rPr kumimoji="0" lang="en-US" altLang="en-US" sz="1000" b="1" i="0" u="none" strike="noStrike" cap="none" normalizeH="0" baseline="0" dirty="0">
+                <a:ln>
+                  <a:noFill/>
+                </a:ln>
+                <a:solidFill>
+                  <a:sysClr val="windowText" lastClr="000000"/>
+                </a:solidFill>
+                <a:effectLst/>
+                <a:latin typeface="JetBrains Mono"/>
+              </a:rPr>
+              <a:t>, @Nullable Bundle </a:t>
+            </a:r>
+            <a:r>
+              <a:rPr kumimoji="0" lang="en-US" altLang="en-US" sz="1000" b="1" i="0" u="none" strike="noStrike" cap="none" normalizeH="0" baseline="0" dirty="0" err="1">
+                <a:ln>
+                  <a:noFill/>
+                </a:ln>
+                <a:solidFill>
+                  <a:sysClr val="windowText" lastClr="000000"/>
+                </a:solidFill>
+                <a:effectLst/>
+                <a:latin typeface="JetBrains Mono"/>
+              </a:rPr>
+              <a:t>savedInstanceState</a:t>
+            </a:r>
+            <a:r>
+              <a:rPr kumimoji="0" lang="en-US" altLang="en-US" sz="1000" b="1" i="0" u="none" strike="noStrike" cap="none" normalizeH="0" baseline="0" dirty="0">
+                <a:ln>
+                  <a:noFill/>
+                </a:ln>
+                <a:solidFill>
+                  <a:sysClr val="windowText" lastClr="000000"/>
+                </a:solidFill>
+                <a:effectLst/>
+                <a:latin typeface="JetBrains Mono"/>
+              </a:rPr>
+              <a:t>) {</a:t>
+            </a:r>
+            <a:br>
+              <a:rPr kumimoji="0" lang="en-US" altLang="en-US" sz="1000" b="1" i="0" u="none" strike="noStrike" cap="none" normalizeH="0" baseline="0" dirty="0">
+                <a:ln>
+                  <a:noFill/>
+                </a:ln>
+                <a:solidFill>
+                  <a:sysClr val="windowText" lastClr="000000"/>
+                </a:solidFill>
+                <a:effectLst/>
+                <a:latin typeface="JetBrains Mono"/>
+              </a:rPr>
+            </a:br>
+            <a:r>
+              <a:rPr kumimoji="0" lang="en-US" altLang="en-US" sz="1000" b="1" i="0" u="none" strike="noStrike" cap="none" normalizeH="0" baseline="0" dirty="0">
+                <a:ln>
+                  <a:noFill/>
+                </a:ln>
+                <a:solidFill>
+                  <a:sysClr val="windowText" lastClr="000000"/>
+                </a:solidFill>
+                <a:effectLst/>
+                <a:latin typeface="JetBrains Mono"/>
+              </a:rPr>
+              <a:t>        </a:t>
+            </a:r>
+            <a:r>
+              <a:rPr kumimoji="0" lang="en-US" altLang="en-US" sz="1000" b="1" i="0" u="none" strike="noStrike" cap="none" normalizeH="0" baseline="0" dirty="0" err="1">
+                <a:ln>
+                  <a:noFill/>
+                </a:ln>
+                <a:solidFill>
+                  <a:sysClr val="windowText" lastClr="000000"/>
+                </a:solidFill>
+                <a:effectLst/>
+                <a:latin typeface="JetBrains Mono"/>
+              </a:rPr>
+              <a:t>super.onViewCreated</a:t>
+            </a:r>
+            <a:r>
+              <a:rPr kumimoji="0" lang="en-US" altLang="en-US" sz="1000" b="1" i="0" u="none" strike="noStrike" cap="none" normalizeH="0" baseline="0" dirty="0">
+                <a:ln>
+                  <a:noFill/>
+                </a:ln>
+                <a:solidFill>
+                  <a:sysClr val="windowText" lastClr="000000"/>
+                </a:solidFill>
+                <a:effectLst/>
+                <a:latin typeface="JetBrains Mono"/>
+              </a:rPr>
+              <a:t>(view, </a:t>
+            </a:r>
+            <a:r>
+              <a:rPr kumimoji="0" lang="en-US" altLang="en-US" sz="1000" b="1" i="0" u="none" strike="noStrike" cap="none" normalizeH="0" baseline="0" dirty="0" err="1">
+                <a:ln>
+                  <a:noFill/>
+                </a:ln>
+                <a:solidFill>
+                  <a:sysClr val="windowText" lastClr="000000"/>
+                </a:solidFill>
+                <a:effectLst/>
+                <a:latin typeface="JetBrains Mono"/>
+              </a:rPr>
+              <a:t>savedInstanceState</a:t>
+            </a:r>
+            <a:r>
+              <a:rPr kumimoji="0" lang="en-US" altLang="en-US" sz="1000" b="1" i="0" u="none" strike="noStrike" cap="none" normalizeH="0" baseline="0" dirty="0">
+                <a:ln>
+                  <a:noFill/>
+                </a:ln>
+                <a:solidFill>
+                  <a:sysClr val="windowText" lastClr="000000"/>
+                </a:solidFill>
+                <a:effectLst/>
+                <a:latin typeface="JetBrains Mono"/>
+              </a:rPr>
+              <a:t>);</a:t>
+            </a:r>
+            <a:br>
+              <a:rPr kumimoji="0" lang="en-US" altLang="en-US" sz="1000" b="1" i="0" u="none" strike="noStrike" cap="none" normalizeH="0" baseline="0" dirty="0">
+                <a:ln>
+                  <a:noFill/>
+                </a:ln>
+                <a:solidFill>
+                  <a:sysClr val="windowText" lastClr="000000"/>
+                </a:solidFill>
+                <a:effectLst/>
+                <a:latin typeface="JetBrains Mono"/>
+              </a:rPr>
+            </a:br>
+            <a:r>
+              <a:rPr kumimoji="0" lang="en-US" altLang="en-US" sz="1000" b="1" i="0" u="none" strike="noStrike" cap="none" normalizeH="0" baseline="0" dirty="0">
+                <a:ln>
+                  <a:noFill/>
+                </a:ln>
+                <a:solidFill>
+                  <a:sysClr val="windowText" lastClr="000000"/>
+                </a:solidFill>
+                <a:effectLst/>
+                <a:latin typeface="JetBrains Mono"/>
+              </a:rPr>
+              <a:t>        button=</a:t>
+            </a:r>
+            <a:r>
+              <a:rPr kumimoji="0" lang="en-US" altLang="en-US" sz="1000" b="1" i="0" u="none" strike="noStrike" cap="none" normalizeH="0" baseline="0" dirty="0" err="1">
+                <a:ln>
+                  <a:noFill/>
+                </a:ln>
+                <a:solidFill>
+                  <a:sysClr val="windowText" lastClr="000000"/>
+                </a:solidFill>
+                <a:effectLst/>
+                <a:latin typeface="JetBrains Mono"/>
+              </a:rPr>
+              <a:t>view.findViewById</a:t>
+            </a:r>
+            <a:r>
+              <a:rPr kumimoji="0" lang="en-US" altLang="en-US" sz="1000" b="1" i="0" u="none" strike="noStrike" cap="none" normalizeH="0" baseline="0" dirty="0">
+                <a:ln>
+                  <a:noFill/>
+                </a:ln>
+                <a:solidFill>
+                  <a:sysClr val="windowText" lastClr="000000"/>
+                </a:solidFill>
+                <a:effectLst/>
+                <a:latin typeface="JetBrains Mono"/>
+              </a:rPr>
+              <a:t>(R.id.</a:t>
+            </a:r>
+            <a:r>
+              <a:rPr kumimoji="0" lang="en-US" altLang="en-US" sz="1000" b="1" i="1" u="none" strike="noStrike" cap="none" normalizeH="0" baseline="0" dirty="0">
+                <a:ln>
+                  <a:noFill/>
+                </a:ln>
+                <a:solidFill>
+                  <a:sysClr val="windowText" lastClr="000000"/>
+                </a:solidFill>
+                <a:effectLst/>
+                <a:latin typeface="JetBrains Mono"/>
+              </a:rPr>
+              <a:t>fragment1_button</a:t>
+            </a:r>
+            <a:r>
+              <a:rPr kumimoji="0" lang="en-US" altLang="en-US" sz="1000" b="1" i="0" u="none" strike="noStrike" cap="none" normalizeH="0" baseline="0" dirty="0">
+                <a:ln>
+                  <a:noFill/>
+                </a:ln>
+                <a:solidFill>
+                  <a:sysClr val="windowText" lastClr="000000"/>
+                </a:solidFill>
+                <a:effectLst/>
+                <a:latin typeface="JetBrains Mono"/>
+              </a:rPr>
+              <a:t>);</a:t>
+            </a:r>
+            <a:br>
+              <a:rPr kumimoji="0" lang="en-US" altLang="en-US" sz="1000" b="1" i="0" u="none" strike="noStrike" cap="none" normalizeH="0" baseline="0" dirty="0">
+                <a:ln>
+                  <a:noFill/>
+                </a:ln>
+                <a:solidFill>
+                  <a:sysClr val="windowText" lastClr="000000"/>
+                </a:solidFill>
+                <a:effectLst/>
+                <a:latin typeface="JetBrains Mono"/>
+              </a:rPr>
+            </a:br>
+            <a:r>
+              <a:rPr kumimoji="0" lang="en-US" altLang="en-US" sz="1000" b="1" i="0" u="none" strike="noStrike" cap="none" normalizeH="0" baseline="0" dirty="0">
+                <a:ln>
+                  <a:noFill/>
+                </a:ln>
+                <a:solidFill>
+                  <a:sysClr val="windowText" lastClr="000000"/>
+                </a:solidFill>
+                <a:effectLst/>
+                <a:latin typeface="JetBrains Mono"/>
+              </a:rPr>
+              <a:t>        </a:t>
+            </a:r>
+            <a:r>
+              <a:rPr kumimoji="0" lang="en-US" altLang="en-US" sz="1000" b="1" i="0" u="none" strike="noStrike" cap="none" normalizeH="0" baseline="0" dirty="0" err="1">
+                <a:ln>
+                  <a:noFill/>
+                </a:ln>
+                <a:solidFill>
+                  <a:sysClr val="windowText" lastClr="000000"/>
+                </a:solidFill>
+                <a:effectLst/>
+                <a:latin typeface="JetBrains Mono"/>
+              </a:rPr>
+              <a:t>button.setOnClickListener</a:t>
+            </a:r>
+            <a:r>
+              <a:rPr kumimoji="0" lang="en-US" altLang="en-US" sz="1000" b="1" i="0" u="none" strike="noStrike" cap="none" normalizeH="0" baseline="0" dirty="0">
+                <a:ln>
+                  <a:noFill/>
+                </a:ln>
+                <a:solidFill>
+                  <a:sysClr val="windowText" lastClr="000000"/>
+                </a:solidFill>
+                <a:effectLst/>
+                <a:latin typeface="JetBrains Mono"/>
+              </a:rPr>
+              <a:t>(v -&gt; </a:t>
+            </a:r>
+            <a:r>
+              <a:rPr kumimoji="0" lang="en-US" altLang="en-US" sz="1000" b="1" i="0" u="none" strike="noStrike" cap="none" normalizeH="0" baseline="0" dirty="0" err="1">
+                <a:ln>
+                  <a:noFill/>
+                </a:ln>
+                <a:solidFill>
+                  <a:sysClr val="windowText" lastClr="000000"/>
+                </a:solidFill>
+                <a:effectLst/>
+                <a:latin typeface="JetBrains Mono"/>
+              </a:rPr>
+              <a:t>Log.</a:t>
+            </a:r>
+            <a:r>
+              <a:rPr kumimoji="0" lang="en-US" altLang="en-US" sz="1000" b="1" i="1" u="none" strike="noStrike" cap="none" normalizeH="0" baseline="0" dirty="0" err="1">
+                <a:ln>
+                  <a:noFill/>
+                </a:ln>
+                <a:solidFill>
+                  <a:sysClr val="windowText" lastClr="000000"/>
+                </a:solidFill>
+                <a:effectLst/>
+                <a:latin typeface="JetBrains Mono"/>
+              </a:rPr>
+              <a:t>d</a:t>
+            </a:r>
+            <a:r>
+              <a:rPr kumimoji="0" lang="en-US" altLang="en-US" sz="1000" b="1" i="0" u="none" strike="noStrike" cap="none" normalizeH="0" baseline="0" dirty="0">
+                <a:ln>
+                  <a:noFill/>
+                </a:ln>
+                <a:solidFill>
+                  <a:sysClr val="windowText" lastClr="000000"/>
+                </a:solidFill>
+                <a:effectLst/>
+                <a:latin typeface="JetBrains Mono"/>
+              </a:rPr>
+              <a:t>("</a:t>
+            </a:r>
+            <a:r>
+              <a:rPr kumimoji="0" lang="en-US" altLang="en-US" sz="1000" b="1" i="0" u="none" strike="noStrike" cap="none" normalizeH="0" baseline="0" dirty="0" err="1">
+                <a:ln>
+                  <a:noFill/>
+                </a:ln>
+                <a:solidFill>
+                  <a:sysClr val="windowText" lastClr="000000"/>
+                </a:solidFill>
+                <a:effectLst/>
+                <a:latin typeface="JetBrains Mono"/>
+              </a:rPr>
+              <a:t>click","button</a:t>
+            </a:r>
+            <a:r>
+              <a:rPr kumimoji="0" lang="en-US" altLang="en-US" sz="1000" b="1" i="0" u="none" strike="noStrike" cap="none" normalizeH="0" baseline="0" dirty="0">
+                <a:ln>
+                  <a:noFill/>
+                </a:ln>
+                <a:solidFill>
+                  <a:sysClr val="windowText" lastClr="000000"/>
+                </a:solidFill>
+                <a:effectLst/>
+                <a:latin typeface="JetBrains Mono"/>
+              </a:rPr>
+              <a:t> inside Fragment1 was clicked"));</a:t>
+            </a:r>
+            <a:br>
+              <a:rPr kumimoji="0" lang="en-US" altLang="en-US" sz="1000" b="1" i="0" u="none" strike="noStrike" cap="none" normalizeH="0" baseline="0" dirty="0">
+                <a:ln>
+                  <a:noFill/>
+                </a:ln>
+                <a:solidFill>
+                  <a:sysClr val="windowText" lastClr="000000"/>
+                </a:solidFill>
+                <a:effectLst/>
+                <a:latin typeface="JetBrains Mono"/>
+              </a:rPr>
+            </a:br>
+            <a:r>
+              <a:rPr kumimoji="0" lang="en-US" altLang="en-US" sz="1000" b="1" i="0" u="none" strike="noStrike" cap="none" normalizeH="0" baseline="0" dirty="0">
+                <a:ln>
+                  <a:noFill/>
+                </a:ln>
+                <a:solidFill>
+                  <a:sysClr val="windowText" lastClr="000000"/>
+                </a:solidFill>
+                <a:effectLst/>
+                <a:latin typeface="JetBrains Mono"/>
+              </a:rPr>
+              <a:t>    }</a:t>
+            </a:r>
+            <a:br>
+              <a:rPr kumimoji="0" lang="en-US" altLang="en-US" sz="1000" b="1" i="0" u="none" strike="noStrike" cap="none" normalizeH="0" baseline="0" dirty="0">
+                <a:ln>
+                  <a:noFill/>
+                </a:ln>
+                <a:solidFill>
+                  <a:sysClr val="windowText" lastClr="000000"/>
+                </a:solidFill>
+                <a:effectLst/>
+                <a:latin typeface="JetBrains Mono"/>
+              </a:rPr>
+            </a:br>
+            <a:r>
+              <a:rPr kumimoji="0" lang="en-US" altLang="en-US" sz="1000" b="1" i="0" u="none" strike="noStrike" cap="none" normalizeH="0" baseline="0" dirty="0">
+                <a:ln>
+                  <a:noFill/>
+                </a:ln>
+                <a:solidFill>
+                  <a:sysClr val="windowText" lastClr="000000"/>
+                </a:solidFill>
+                <a:effectLst/>
+                <a:latin typeface="JetBrains Mono"/>
+              </a:rPr>
+              <a:t>}</a:t>
+            </a:r>
+            <a:endParaRPr kumimoji="0" lang="en-US" altLang="en-US" sz="1800" b="1" i="0" u="none" strike="noStrike" cap="none" normalizeH="0" baseline="0" dirty="0">
+              <a:ln>
+                <a:noFill/>
+              </a:ln>
+              <a:solidFill>
+                <a:sysClr val="windowText" lastClr="000000"/>
+              </a:solidFill>
+              <a:effectLst/>
+              <a:latin typeface="Arial" panose="020B0604020202020204" pitchFamily="34" charset="0"/>
+            </a:endParaRPr>
+          </a:p>
+        </p:txBody>
+      </p:sp>
+    </p:spTree>
+    <p:extLst>
+      <p:ext uri="{BB962C8B-B14F-4D97-AF65-F5344CB8AC3E}">
+        <p14:creationId xmlns:p14="http://schemas.microsoft.com/office/powerpoint/2010/main" val="3708039069"/>
+      </p:ext>
+    </p:extLst>
+  </p:cSld>
+  <p:clrMapOvr>
+    <a:masterClrMapping/>
+  </p:clrMapOvr>
+</p:sld>
+</file>
+
+<file path=ppt/slides/slide61.xml><?xml version="1.0" encoding="utf-8"?>
+<p:sld xmlns:a="http://schemas.openxmlformats.org/drawingml/2006/main" xmlns:r="http://schemas.openxmlformats.org/officeDocument/2006/relationships" xmlns:p="http://schemas.openxmlformats.org/presentationml/2006/main">
+  <p:cSld>
+    <p:spTree>
+      <p:nvGrpSpPr>
+        <p:cNvPr id="1" name=""/>
+        <p:cNvGrpSpPr/>
+        <p:nvPr/>
+      </p:nvGrpSpPr>
+      <p:grpSpPr>
+        <a:xfrm>
+          <a:off x="0" y="0"/>
+          <a:ext cx="0" cy="0"/>
+          <a:chOff x="0" y="0"/>
+          <a:chExt cx="0" cy="0"/>
+        </a:xfrm>
+      </p:grpSpPr>
+      <p:sp>
+        <p:nvSpPr>
+          <p:cNvPr id="2" name="Titolo 1">
+            <a:extLst>
+              <a:ext uri="{FF2B5EF4-FFF2-40B4-BE49-F238E27FC236}">
                 <a16:creationId xmlns:a16="http://schemas.microsoft.com/office/drawing/2014/main" id="{55E3C518-DF92-DD4D-5E3A-2E7995CD2089}"/>
               </a:ext>
             </a:extLst>
@@ -30508,773 +31780,6 @@
     <p:extLst>
       <p:ext uri="{BB962C8B-B14F-4D97-AF65-F5344CB8AC3E}">
         <p14:creationId xmlns:p14="http://schemas.microsoft.com/office/powerpoint/2010/main" val="3271456661"/>
-      </p:ext>
-    </p:extLst>
-  </p:cSld>
-  <p:clrMapOvr>
-    <a:masterClrMapping/>
-  </p:clrMapOvr>
-</p:sld>
-</file>
-
-<file path=ppt/slides/slide61.xml><?xml version="1.0" encoding="utf-8"?>
-<p:sld xmlns:a="http://schemas.openxmlformats.org/drawingml/2006/main" xmlns:r="http://schemas.openxmlformats.org/officeDocument/2006/relationships" xmlns:p="http://schemas.openxmlformats.org/presentationml/2006/main" show="0">
-  <p:cSld>
-    <p:spTree>
-      <p:nvGrpSpPr>
-        <p:cNvPr id="1" name=""/>
-        <p:cNvGrpSpPr/>
-        <p:nvPr/>
-      </p:nvGrpSpPr>
-      <p:grpSpPr>
-        <a:xfrm>
-          <a:off x="0" y="0"/>
-          <a:ext cx="0" cy="0"/>
-          <a:chOff x="0" y="0"/>
-          <a:chExt cx="0" cy="0"/>
-        </a:xfrm>
-      </p:grpSpPr>
-      <p:sp>
-        <p:nvSpPr>
-          <p:cNvPr id="2" name="Titolo 1">
-            <a:extLst>
-              <a:ext uri="{FF2B5EF4-FFF2-40B4-BE49-F238E27FC236}">
-                <a16:creationId xmlns:a16="http://schemas.microsoft.com/office/drawing/2014/main" id="{1B9FCCB9-2013-14CC-D23E-80D92FBE871E}"/>
-              </a:ext>
-            </a:extLst>
-          </p:cNvPr>
-          <p:cNvSpPr>
-            <a:spLocks noGrp="1"/>
-          </p:cNvSpPr>
-          <p:nvPr>
-            <p:ph type="title"/>
-          </p:nvPr>
-        </p:nvSpPr>
-        <p:spPr/>
-        <p:txBody>
-          <a:bodyPr/>
-          <a:lstStyle/>
-          <a:p>
-            <a:r>
-              <a:rPr lang="en-US" dirty="0"/>
-              <a:t>Activity vs Fragment</a:t>
-            </a:r>
-          </a:p>
-        </p:txBody>
-      </p:sp>
-      <p:graphicFrame>
-        <p:nvGraphicFramePr>
-          <p:cNvPr id="4" name="Tabella 4">
-            <a:extLst>
-              <a:ext uri="{FF2B5EF4-FFF2-40B4-BE49-F238E27FC236}">
-                <a16:creationId xmlns:a16="http://schemas.microsoft.com/office/drawing/2014/main" id="{65BED8BA-1ACB-1519-C4E9-265871D3DBDC}"/>
-              </a:ext>
-            </a:extLst>
-          </p:cNvPr>
-          <p:cNvGraphicFramePr>
-            <a:graphicFrameLocks noGrp="1"/>
-          </p:cNvGraphicFramePr>
-          <p:nvPr>
-            <p:ph idx="1"/>
-            <p:extLst>
-              <p:ext uri="{D42A27DB-BD31-4B8C-83A1-F6EECF244321}">
-                <p14:modId xmlns:p14="http://schemas.microsoft.com/office/powerpoint/2010/main" val="381607944"/>
-              </p:ext>
-            </p:extLst>
-          </p:nvPr>
-        </p:nvGraphicFramePr>
-        <p:xfrm>
-          <a:off x="856343" y="2245745"/>
-          <a:ext cx="10261600" cy="6434225"/>
-        </p:xfrm>
-        <a:graphic>
-          <a:graphicData uri="http://schemas.openxmlformats.org/drawingml/2006/table">
-            <a:tbl>
-              <a:tblPr firstRow="1" bandRow="1">
-                <a:tableStyleId>{93296810-A885-4BE3-A3E7-6D5BEEA58F35}</a:tableStyleId>
-              </a:tblPr>
-              <a:tblGrid>
-                <a:gridCol w="5130800">
-                  <a:extLst>
-                    <a:ext uri="{9D8B030D-6E8A-4147-A177-3AD203B41FA5}">
-                      <a16:colId xmlns:a16="http://schemas.microsoft.com/office/drawing/2014/main" val="181064694"/>
-                    </a:ext>
-                  </a:extLst>
-                </a:gridCol>
-                <a:gridCol w="5130800">
-                  <a:extLst>
-                    <a:ext uri="{9D8B030D-6E8A-4147-A177-3AD203B41FA5}">
-                      <a16:colId xmlns:a16="http://schemas.microsoft.com/office/drawing/2014/main" val="1352705863"/>
-                    </a:ext>
-                  </a:extLst>
-                </a:gridCol>
-              </a:tblGrid>
-              <a:tr h="0">
-                <a:tc>
-                  <a:txBody>
-                    <a:bodyPr/>
-                    <a:lstStyle/>
-                    <a:p>
-                      <a:pPr algn="ctr"/>
-                      <a:r>
-                        <a:rPr lang="en-US" sz="2400" dirty="0"/>
-                        <a:t>Activity states</a:t>
-                      </a:r>
-                    </a:p>
-                  </a:txBody>
-                  <a:tcPr/>
-                </a:tc>
-                <a:tc>
-                  <a:txBody>
-                    <a:bodyPr/>
-                    <a:lstStyle/>
-                    <a:p>
-                      <a:pPr algn="ctr"/>
-                      <a:r>
-                        <a:rPr lang="en-US" sz="2400" dirty="0"/>
-                        <a:t>Fragment callbacks</a:t>
-                      </a:r>
-                    </a:p>
-                    <a:p>
-                      <a:pPr algn="ctr"/>
-                      <a:endParaRPr lang="en-US" dirty="0"/>
-                    </a:p>
-                  </a:txBody>
-                  <a:tcPr/>
-                </a:tc>
-                <a:extLst>
-                  <a:ext uri="{0D108BD9-81ED-4DB2-BD59-A6C34878D82A}">
-                    <a16:rowId xmlns:a16="http://schemas.microsoft.com/office/drawing/2014/main" val="708585786"/>
-                  </a:ext>
-                </a:extLst>
-              </a:tr>
-              <a:tr h="2045105">
-                <a:tc>
-                  <a:txBody>
-                    <a:bodyPr/>
-                    <a:lstStyle/>
-                    <a:p>
-                      <a:pPr algn="ctr"/>
-                      <a:r>
-                        <a:rPr lang="en-US" sz="2400" b="1" dirty="0"/>
-                        <a:t>Activity created</a:t>
-                      </a:r>
-                    </a:p>
-                  </a:txBody>
-                  <a:tcPr anchor="ctr"/>
-                </a:tc>
-                <a:tc>
-                  <a:txBody>
-                    <a:bodyPr/>
-                    <a:lstStyle/>
-                    <a:p>
-                      <a:pPr algn="ctr"/>
-                      <a:r>
-                        <a:rPr lang="en-US" dirty="0"/>
-                        <a:t>onAttach() </a:t>
-                      </a:r>
-                    </a:p>
-                    <a:p>
-                      <a:pPr algn="ctr"/>
-                      <a:endParaRPr lang="en-US" dirty="0"/>
-                    </a:p>
-                    <a:p>
-                      <a:pPr algn="ctr"/>
-                      <a:r>
-                        <a:rPr lang="en-US" dirty="0"/>
-                        <a:t>onCreate() </a:t>
-                      </a:r>
-                    </a:p>
-                    <a:p>
-                      <a:pPr algn="ctr"/>
-                      <a:endParaRPr lang="en-US" dirty="0"/>
-                    </a:p>
-                    <a:p>
-                      <a:pPr algn="ctr"/>
-                      <a:r>
-                        <a:rPr lang="en-US" dirty="0"/>
-                        <a:t>onCreateView() </a:t>
-                      </a:r>
-                    </a:p>
-                    <a:p>
-                      <a:pPr algn="ctr"/>
-                      <a:endParaRPr lang="en-US" dirty="0"/>
-                    </a:p>
-                    <a:p>
-                      <a:pPr algn="ctr"/>
-                      <a:r>
-                        <a:rPr lang="en-US" dirty="0"/>
-                        <a:t>onActivityCreated()</a:t>
-                      </a:r>
-                    </a:p>
-                  </a:txBody>
-                  <a:tcPr/>
-                </a:tc>
-                <a:extLst>
-                  <a:ext uri="{0D108BD9-81ED-4DB2-BD59-A6C34878D82A}">
-                    <a16:rowId xmlns:a16="http://schemas.microsoft.com/office/drawing/2014/main" val="502179869"/>
-                  </a:ext>
-                </a:extLst>
-              </a:tr>
-              <a:tr h="472603">
-                <a:tc>
-                  <a:txBody>
-                    <a:bodyPr/>
-                    <a:lstStyle/>
-                    <a:p>
-                      <a:pPr algn="ctr"/>
-                      <a:r>
-                        <a:rPr lang="en-US" sz="2400" b="1" dirty="0"/>
-                        <a:t>Activity started</a:t>
-                      </a:r>
-                    </a:p>
-                  </a:txBody>
-                  <a:tcPr/>
-                </a:tc>
-                <a:tc>
-                  <a:txBody>
-                    <a:bodyPr/>
-                    <a:lstStyle/>
-                    <a:p>
-                      <a:pPr algn="ctr"/>
-                      <a:endParaRPr lang="en-US" dirty="0"/>
-                    </a:p>
-                    <a:p>
-                      <a:pPr algn="ctr"/>
-                      <a:r>
-                        <a:rPr lang="en-US" dirty="0"/>
-                        <a:t>onStart() </a:t>
-                      </a:r>
-                    </a:p>
-                    <a:p>
-                      <a:pPr algn="ctr"/>
-                      <a:endParaRPr lang="en-US" dirty="0"/>
-                    </a:p>
-                  </a:txBody>
-                  <a:tcPr/>
-                </a:tc>
-                <a:extLst>
-                  <a:ext uri="{0D108BD9-81ED-4DB2-BD59-A6C34878D82A}">
-                    <a16:rowId xmlns:a16="http://schemas.microsoft.com/office/drawing/2014/main" val="3558271193"/>
-                  </a:ext>
-                </a:extLst>
-              </a:tr>
-              <a:tr h="472603">
-                <a:tc>
-                  <a:txBody>
-                    <a:bodyPr/>
-                    <a:lstStyle/>
-                    <a:p>
-                      <a:pPr algn="ctr"/>
-                      <a:r>
-                        <a:rPr lang="en-US" sz="2400" b="1" dirty="0"/>
-                        <a:t>Activity resumed</a:t>
-                      </a:r>
-                    </a:p>
-                  </a:txBody>
-                  <a:tcPr/>
-                </a:tc>
-                <a:tc>
-                  <a:txBody>
-                    <a:bodyPr/>
-                    <a:lstStyle/>
-                    <a:p>
-                      <a:pPr algn="ctr"/>
-                      <a:r>
-                        <a:rPr lang="en-US" dirty="0"/>
-                        <a:t>onResume()</a:t>
-                      </a:r>
-                    </a:p>
-                    <a:p>
-                      <a:pPr algn="ctr"/>
-                      <a:endParaRPr lang="en-US" dirty="0"/>
-                    </a:p>
-                  </a:txBody>
-                  <a:tcPr/>
-                </a:tc>
-                <a:extLst>
-                  <a:ext uri="{0D108BD9-81ED-4DB2-BD59-A6C34878D82A}">
-                    <a16:rowId xmlns:a16="http://schemas.microsoft.com/office/drawing/2014/main" val="3612864522"/>
-                  </a:ext>
-                </a:extLst>
-              </a:tr>
-              <a:tr h="472603">
-                <a:tc>
-                  <a:txBody>
-                    <a:bodyPr/>
-                    <a:lstStyle/>
-                    <a:p>
-                      <a:pPr algn="ctr"/>
-                      <a:r>
-                        <a:rPr lang="en-US" sz="2400" b="1" dirty="0"/>
-                        <a:t>Activity paused</a:t>
-                      </a:r>
-                    </a:p>
-                  </a:txBody>
-                  <a:tcPr/>
-                </a:tc>
-                <a:tc>
-                  <a:txBody>
-                    <a:bodyPr/>
-                    <a:lstStyle/>
-                    <a:p>
-                      <a:pPr algn="ctr"/>
-                      <a:r>
-                        <a:rPr lang="en-US" dirty="0"/>
-                        <a:t>onStop()</a:t>
-                      </a:r>
-                    </a:p>
-                    <a:p>
-                      <a:pPr algn="ctr"/>
-                      <a:endParaRPr lang="en-US" dirty="0"/>
-                    </a:p>
-                  </a:txBody>
-                  <a:tcPr/>
-                </a:tc>
-                <a:extLst>
-                  <a:ext uri="{0D108BD9-81ED-4DB2-BD59-A6C34878D82A}">
-                    <a16:rowId xmlns:a16="http://schemas.microsoft.com/office/drawing/2014/main" val="2654438743"/>
-                  </a:ext>
-                </a:extLst>
-              </a:tr>
-              <a:tr h="562964">
-                <a:tc>
-                  <a:txBody>
-                    <a:bodyPr/>
-                    <a:lstStyle/>
-                    <a:p>
-                      <a:pPr algn="ctr"/>
-                      <a:endParaRPr lang="en-US" dirty="0"/>
-                    </a:p>
-                    <a:p>
-                      <a:pPr algn="ctr"/>
-                      <a:r>
-                        <a:rPr lang="en-US" sz="2400" b="1" dirty="0"/>
-                        <a:t>Activity destroyed</a:t>
-                      </a:r>
-                    </a:p>
-                  </a:txBody>
-                  <a:tcPr/>
-                </a:tc>
-                <a:tc>
-                  <a:txBody>
-                    <a:bodyPr/>
-                    <a:lstStyle/>
-                    <a:p>
-                      <a:pPr algn="ctr"/>
-                      <a:r>
-                        <a:rPr lang="en-US" dirty="0"/>
-                        <a:t>onDestroyView()</a:t>
-                      </a:r>
-                    </a:p>
-                    <a:p>
-                      <a:pPr algn="ctr"/>
-                      <a:endParaRPr lang="en-US" dirty="0"/>
-                    </a:p>
-                    <a:p>
-                      <a:pPr algn="ctr"/>
-                      <a:r>
-                        <a:rPr lang="en-US" dirty="0"/>
-                        <a:t>onDestroy()</a:t>
-                      </a:r>
-                    </a:p>
-                    <a:p>
-                      <a:pPr algn="ctr"/>
-                      <a:endParaRPr lang="en-US" dirty="0"/>
-                    </a:p>
-                    <a:p>
-                      <a:pPr algn="ctr"/>
-                      <a:r>
-                        <a:rPr lang="en-US" dirty="0"/>
-                        <a:t>onDetach()</a:t>
-                      </a:r>
-                    </a:p>
-                  </a:txBody>
-                  <a:tcPr/>
-                </a:tc>
-                <a:extLst>
-                  <a:ext uri="{0D108BD9-81ED-4DB2-BD59-A6C34878D82A}">
-                    <a16:rowId xmlns:a16="http://schemas.microsoft.com/office/drawing/2014/main" val="897891260"/>
-                  </a:ext>
-                </a:extLst>
-              </a:tr>
-            </a:tbl>
-          </a:graphicData>
-        </a:graphic>
-      </p:graphicFrame>
-      <p:cxnSp>
-        <p:nvCxnSpPr>
-          <p:cNvPr id="6" name="Connettore 2 5">
-            <a:extLst>
-              <a:ext uri="{FF2B5EF4-FFF2-40B4-BE49-F238E27FC236}">
-                <a16:creationId xmlns:a16="http://schemas.microsoft.com/office/drawing/2014/main" id="{56CB9AF5-0998-9192-4212-E4BF30542C10}"/>
-              </a:ext>
-            </a:extLst>
-          </p:cNvPr>
-          <p:cNvCxnSpPr>
-            <a:cxnSpLocks/>
-          </p:cNvCxnSpPr>
-          <p:nvPr/>
-        </p:nvCxnSpPr>
-        <p:spPr>
-          <a:xfrm>
-            <a:off x="8505372" y="3247571"/>
-            <a:ext cx="0" cy="308429"/>
-          </a:xfrm>
-          <a:prstGeom prst="straightConnector1">
-            <a:avLst/>
-          </a:prstGeom>
-          <a:ln>
-            <a:tailEnd type="triangle"/>
-          </a:ln>
-        </p:spPr>
-        <p:style>
-          <a:lnRef idx="2">
-            <a:schemeClr val="dk1"/>
-          </a:lnRef>
-          <a:fillRef idx="0">
-            <a:schemeClr val="dk1"/>
-          </a:fillRef>
-          <a:effectRef idx="1">
-            <a:schemeClr val="dk1"/>
-          </a:effectRef>
-          <a:fontRef idx="minor">
-            <a:schemeClr val="tx1"/>
-          </a:fontRef>
-        </p:style>
-      </p:cxnSp>
-      <p:cxnSp>
-        <p:nvCxnSpPr>
-          <p:cNvPr id="9" name="Connettore 2 8">
-            <a:extLst>
-              <a:ext uri="{FF2B5EF4-FFF2-40B4-BE49-F238E27FC236}">
-                <a16:creationId xmlns:a16="http://schemas.microsoft.com/office/drawing/2014/main" id="{4719452E-92E6-6F7B-9AB0-B692459864AA}"/>
-              </a:ext>
-            </a:extLst>
-          </p:cNvPr>
-          <p:cNvCxnSpPr>
-            <a:cxnSpLocks/>
-          </p:cNvCxnSpPr>
-          <p:nvPr/>
-        </p:nvCxnSpPr>
-        <p:spPr>
-          <a:xfrm>
-            <a:off x="8505372" y="3875314"/>
-            <a:ext cx="0" cy="243114"/>
-          </a:xfrm>
-          <a:prstGeom prst="straightConnector1">
-            <a:avLst/>
-          </a:prstGeom>
-          <a:ln>
-            <a:tailEnd type="triangle"/>
-          </a:ln>
-        </p:spPr>
-        <p:style>
-          <a:lnRef idx="2">
-            <a:schemeClr val="dk1"/>
-          </a:lnRef>
-          <a:fillRef idx="0">
-            <a:schemeClr val="dk1"/>
-          </a:fillRef>
-          <a:effectRef idx="1">
-            <a:schemeClr val="dk1"/>
-          </a:effectRef>
-          <a:fontRef idx="minor">
-            <a:schemeClr val="tx1"/>
-          </a:fontRef>
-        </p:style>
-      </p:cxnSp>
-      <p:cxnSp>
-        <p:nvCxnSpPr>
-          <p:cNvPr id="12" name="Connettore 2 11">
-            <a:extLst>
-              <a:ext uri="{FF2B5EF4-FFF2-40B4-BE49-F238E27FC236}">
-                <a16:creationId xmlns:a16="http://schemas.microsoft.com/office/drawing/2014/main" id="{EA553F5D-A917-BC89-1A95-5630508E33DF}"/>
-              </a:ext>
-            </a:extLst>
-          </p:cNvPr>
-          <p:cNvCxnSpPr>
-            <a:cxnSpLocks/>
-          </p:cNvCxnSpPr>
-          <p:nvPr/>
-        </p:nvCxnSpPr>
-        <p:spPr>
-          <a:xfrm>
-            <a:off x="8505372" y="4448627"/>
-            <a:ext cx="0" cy="243114"/>
-          </a:xfrm>
-          <a:prstGeom prst="straightConnector1">
-            <a:avLst/>
-          </a:prstGeom>
-          <a:ln>
-            <a:tailEnd type="triangle"/>
-          </a:ln>
-        </p:spPr>
-        <p:style>
-          <a:lnRef idx="2">
-            <a:schemeClr val="dk1"/>
-          </a:lnRef>
-          <a:fillRef idx="0">
-            <a:schemeClr val="dk1"/>
-          </a:fillRef>
-          <a:effectRef idx="1">
-            <a:schemeClr val="dk1"/>
-          </a:effectRef>
-          <a:fontRef idx="minor">
-            <a:schemeClr val="tx1"/>
-          </a:fontRef>
-        </p:style>
-      </p:cxnSp>
-      <p:cxnSp>
-        <p:nvCxnSpPr>
-          <p:cNvPr id="13" name="Connettore 2 12">
-            <a:extLst>
-              <a:ext uri="{FF2B5EF4-FFF2-40B4-BE49-F238E27FC236}">
-                <a16:creationId xmlns:a16="http://schemas.microsoft.com/office/drawing/2014/main" id="{8396ECB4-93D0-7617-F5E5-860FB766A899}"/>
-              </a:ext>
-            </a:extLst>
-          </p:cNvPr>
-          <p:cNvCxnSpPr>
-            <a:cxnSpLocks/>
-          </p:cNvCxnSpPr>
-          <p:nvPr/>
-        </p:nvCxnSpPr>
-        <p:spPr>
-          <a:xfrm>
-            <a:off x="8505372" y="4924877"/>
-            <a:ext cx="0" cy="376012"/>
-          </a:xfrm>
-          <a:prstGeom prst="straightConnector1">
-            <a:avLst/>
-          </a:prstGeom>
-          <a:ln>
-            <a:tailEnd type="triangle"/>
-          </a:ln>
-        </p:spPr>
-        <p:style>
-          <a:lnRef idx="2">
-            <a:schemeClr val="dk1"/>
-          </a:lnRef>
-          <a:fillRef idx="0">
-            <a:schemeClr val="dk1"/>
-          </a:fillRef>
-          <a:effectRef idx="1">
-            <a:schemeClr val="dk1"/>
-          </a:effectRef>
-          <a:fontRef idx="minor">
-            <a:schemeClr val="tx1"/>
-          </a:fontRef>
-        </p:style>
-      </p:cxnSp>
-      <p:cxnSp>
-        <p:nvCxnSpPr>
-          <p:cNvPr id="15" name="Connettore 2 14">
-            <a:extLst>
-              <a:ext uri="{FF2B5EF4-FFF2-40B4-BE49-F238E27FC236}">
-                <a16:creationId xmlns:a16="http://schemas.microsoft.com/office/drawing/2014/main" id="{D7DBB196-67FC-0559-2909-3C517A720E72}"/>
-              </a:ext>
-            </a:extLst>
-          </p:cNvPr>
-          <p:cNvCxnSpPr>
-            <a:cxnSpLocks/>
-          </p:cNvCxnSpPr>
-          <p:nvPr/>
-        </p:nvCxnSpPr>
-        <p:spPr>
-          <a:xfrm>
-            <a:off x="8505372" y="5553527"/>
-            <a:ext cx="0" cy="376012"/>
-          </a:xfrm>
-          <a:prstGeom prst="straightConnector1">
-            <a:avLst/>
-          </a:prstGeom>
-          <a:ln>
-            <a:tailEnd type="triangle"/>
-          </a:ln>
-        </p:spPr>
-        <p:style>
-          <a:lnRef idx="2">
-            <a:schemeClr val="dk1"/>
-          </a:lnRef>
-          <a:fillRef idx="0">
-            <a:schemeClr val="dk1"/>
-          </a:fillRef>
-          <a:effectRef idx="1">
-            <a:schemeClr val="dk1"/>
-          </a:effectRef>
-          <a:fontRef idx="minor">
-            <a:schemeClr val="tx1"/>
-          </a:fontRef>
-        </p:style>
-      </p:cxnSp>
-      <p:cxnSp>
-        <p:nvCxnSpPr>
-          <p:cNvPr id="16" name="Connettore 2 15">
-            <a:extLst>
-              <a:ext uri="{FF2B5EF4-FFF2-40B4-BE49-F238E27FC236}">
-                <a16:creationId xmlns:a16="http://schemas.microsoft.com/office/drawing/2014/main" id="{62275131-D086-AEFB-EA18-2061B78A38DE}"/>
-              </a:ext>
-            </a:extLst>
-          </p:cNvPr>
-          <p:cNvCxnSpPr>
-            <a:cxnSpLocks/>
-          </p:cNvCxnSpPr>
-          <p:nvPr/>
-        </p:nvCxnSpPr>
-        <p:spPr>
-          <a:xfrm>
-            <a:off x="8505372" y="6220277"/>
-            <a:ext cx="0" cy="376012"/>
-          </a:xfrm>
-          <a:prstGeom prst="straightConnector1">
-            <a:avLst/>
-          </a:prstGeom>
-          <a:ln>
-            <a:tailEnd type="triangle"/>
-          </a:ln>
-        </p:spPr>
-        <p:style>
-          <a:lnRef idx="2">
-            <a:schemeClr val="dk1"/>
-          </a:lnRef>
-          <a:fillRef idx="0">
-            <a:schemeClr val="dk1"/>
-          </a:fillRef>
-          <a:effectRef idx="1">
-            <a:schemeClr val="dk1"/>
-          </a:effectRef>
-          <a:fontRef idx="minor">
-            <a:schemeClr val="tx1"/>
-          </a:fontRef>
-        </p:style>
-      </p:cxnSp>
-      <p:cxnSp>
-        <p:nvCxnSpPr>
-          <p:cNvPr id="17" name="Connettore 2 16">
-            <a:extLst>
-              <a:ext uri="{FF2B5EF4-FFF2-40B4-BE49-F238E27FC236}">
-                <a16:creationId xmlns:a16="http://schemas.microsoft.com/office/drawing/2014/main" id="{02BC7F46-6A1D-154B-03B7-094CF950C09C}"/>
-              </a:ext>
-            </a:extLst>
-          </p:cNvPr>
-          <p:cNvCxnSpPr>
-            <a:cxnSpLocks/>
-          </p:cNvCxnSpPr>
-          <p:nvPr/>
-        </p:nvCxnSpPr>
-        <p:spPr>
-          <a:xfrm>
-            <a:off x="8505372" y="6867977"/>
-            <a:ext cx="0" cy="376012"/>
-          </a:xfrm>
-          <a:prstGeom prst="straightConnector1">
-            <a:avLst/>
-          </a:prstGeom>
-          <a:ln>
-            <a:tailEnd type="triangle"/>
-          </a:ln>
-        </p:spPr>
-        <p:style>
-          <a:lnRef idx="2">
-            <a:schemeClr val="dk1"/>
-          </a:lnRef>
-          <a:fillRef idx="0">
-            <a:schemeClr val="dk1"/>
-          </a:fillRef>
-          <a:effectRef idx="1">
-            <a:schemeClr val="dk1"/>
-          </a:effectRef>
-          <a:fontRef idx="minor">
-            <a:schemeClr val="tx1"/>
-          </a:fontRef>
-        </p:style>
-      </p:cxnSp>
-      <p:cxnSp>
-        <p:nvCxnSpPr>
-          <p:cNvPr id="18" name="Connettore 2 17">
-            <a:extLst>
-              <a:ext uri="{FF2B5EF4-FFF2-40B4-BE49-F238E27FC236}">
-                <a16:creationId xmlns:a16="http://schemas.microsoft.com/office/drawing/2014/main" id="{07DF238A-7649-B36E-9CD0-388B23F5953D}"/>
-              </a:ext>
-            </a:extLst>
-          </p:cNvPr>
-          <p:cNvCxnSpPr>
-            <a:cxnSpLocks/>
-          </p:cNvCxnSpPr>
-          <p:nvPr/>
-        </p:nvCxnSpPr>
-        <p:spPr>
-          <a:xfrm>
-            <a:off x="8505372" y="7525202"/>
-            <a:ext cx="0" cy="261712"/>
-          </a:xfrm>
-          <a:prstGeom prst="straightConnector1">
-            <a:avLst/>
-          </a:prstGeom>
-          <a:ln>
-            <a:tailEnd type="triangle"/>
-          </a:ln>
-        </p:spPr>
-        <p:style>
-          <a:lnRef idx="2">
-            <a:schemeClr val="dk1"/>
-          </a:lnRef>
-          <a:fillRef idx="0">
-            <a:schemeClr val="dk1"/>
-          </a:fillRef>
-          <a:effectRef idx="1">
-            <a:schemeClr val="dk1"/>
-          </a:effectRef>
-          <a:fontRef idx="minor">
-            <a:schemeClr val="tx1"/>
-          </a:fontRef>
-        </p:style>
-      </p:cxnSp>
-      <p:cxnSp>
-        <p:nvCxnSpPr>
-          <p:cNvPr id="20" name="Connettore 2 19">
-            <a:extLst>
-              <a:ext uri="{FF2B5EF4-FFF2-40B4-BE49-F238E27FC236}">
-                <a16:creationId xmlns:a16="http://schemas.microsoft.com/office/drawing/2014/main" id="{1582E641-258A-1FD6-36C5-96653013F170}"/>
-              </a:ext>
-            </a:extLst>
-          </p:cNvPr>
-          <p:cNvCxnSpPr>
-            <a:cxnSpLocks/>
-          </p:cNvCxnSpPr>
-          <p:nvPr/>
-        </p:nvCxnSpPr>
-        <p:spPr>
-          <a:xfrm>
-            <a:off x="8505372" y="8087177"/>
-            <a:ext cx="0" cy="299812"/>
-          </a:xfrm>
-          <a:prstGeom prst="straightConnector1">
-            <a:avLst/>
-          </a:prstGeom>
-          <a:ln>
-            <a:tailEnd type="triangle"/>
-          </a:ln>
-        </p:spPr>
-        <p:style>
-          <a:lnRef idx="2">
-            <a:schemeClr val="dk1"/>
-          </a:lnRef>
-          <a:fillRef idx="0">
-            <a:schemeClr val="dk1"/>
-          </a:fillRef>
-          <a:effectRef idx="1">
-            <a:schemeClr val="dk1"/>
-          </a:effectRef>
-          <a:fontRef idx="minor">
-            <a:schemeClr val="tx1"/>
-          </a:fontRef>
-        </p:style>
-      </p:cxnSp>
-    </p:spTree>
-    <p:extLst>
-      <p:ext uri="{BB962C8B-B14F-4D97-AF65-F5344CB8AC3E}">
-        <p14:creationId xmlns:p14="http://schemas.microsoft.com/office/powerpoint/2010/main" val="337712533"/>
       </p:ext>
     </p:extLst>
   </p:cSld>

</xml_diff>